<commit_message>
Presentation to be presented :)
</commit_message>
<xml_diff>
--- a/Presentation_Python_Password_Generator.pptx
+++ b/Presentation_Python_Password_Generator.pptx
@@ -12,6 +12,9 @@
     <p:sldId id="257" r:id="rId7"/>
     <p:sldId id="258" r:id="rId8"/>
     <p:sldId id="259" r:id="rId9"/>
+    <p:sldId id="260" r:id="rId10"/>
+    <p:sldId id="261" r:id="rId11"/>
+    <p:sldId id="262" r:id="rId12"/>
   </p:sldIdLst>
   <p:sldSz cy="5143500" cx="9144000"/>
   <p:notesSz cx="6858000" cy="9144000"/>
@@ -906,7 +909,7 @@
       </p:grpSpPr>
       <p:sp>
         <p:nvSpPr>
-          <p:cNvPr id="64" name="Google Shape;64;g16b55a7a1f4_0_1186:notes"/>
+          <p:cNvPr id="64" name="Google Shape;64;g16b723c71ca_0_21:notes"/>
           <p:cNvSpPr/>
           <p:nvPr>
             <p:ph idx="2" type="sldImg"/>
@@ -941,7 +944,7 @@
       </p:sp>
       <p:sp>
         <p:nvSpPr>
-          <p:cNvPr id="65" name="Google Shape;65;g16b55a7a1f4_0_1186:notes"/>
+          <p:cNvPr id="65" name="Google Shape;65;g16b723c71ca_0_21:notes"/>
           <p:cNvSpPr txBox="1"/>
           <p:nvPr>
             <p:ph idx="1" type="body"/>
@@ -991,7 +994,7 @@
   <p:cSld>
     <p:spTree>
       <p:nvGrpSpPr>
-        <p:cNvPr id="71" name="Shape 71"/>
+        <p:cNvPr id="69" name="Shape 69"/>
         <p:cNvGrpSpPr/>
         <p:nvPr/>
       </p:nvGrpSpPr>
@@ -1005,7 +1008,7 @@
       </p:grpSpPr>
       <p:sp>
         <p:nvSpPr>
-          <p:cNvPr id="72" name="Google Shape;72;g16b55a7a1f4_0_1192:notes"/>
+          <p:cNvPr id="70" name="Google Shape;70;g16b723c71ca_0_5:notes"/>
           <p:cNvSpPr/>
           <p:nvPr>
             <p:ph idx="2" type="sldImg"/>
@@ -1040,7 +1043,304 @@
       </p:sp>
       <p:sp>
         <p:nvSpPr>
-          <p:cNvPr id="73" name="Google Shape;73;g16b55a7a1f4_0_1192:notes"/>
+          <p:cNvPr id="71" name="Google Shape;71;g16b723c71ca_0_5:notes"/>
+          <p:cNvSpPr txBox="1"/>
+          <p:nvPr>
+            <p:ph idx="1" type="body"/>
+          </p:nvPr>
+        </p:nvSpPr>
+        <p:spPr>
+          <a:xfrm>
+            <a:off x="685800" y="4343400"/>
+            <a:ext cx="5486400" cy="4114800"/>
+          </a:xfrm>
+          <a:prstGeom prst="rect">
+            <a:avLst/>
+          </a:prstGeom>
+        </p:spPr>
+        <p:txBody>
+          <a:bodyPr anchorCtr="0" anchor="t" bIns="91425" lIns="91425" spcFirstLastPara="1" rIns="91425" wrap="square" tIns="91425">
+            <a:noAutofit/>
+          </a:bodyPr>
+          <a:lstStyle/>
+          <a:p>
+            <a:pPr indent="0" lvl="0" marL="0" rtl="0" algn="l">
+              <a:spcBef>
+                <a:spcPts val="0"/>
+              </a:spcBef>
+              <a:spcAft>
+                <a:spcPts val="0"/>
+              </a:spcAft>
+              <a:buNone/>
+            </a:pPr>
+            <a:r>
+              <a:t/>
+            </a:r>
+            <a:endParaRPr/>
+          </a:p>
+        </p:txBody>
+      </p:sp>
+    </p:spTree>
+  </p:cSld>
+  <p:clrMapOvr>
+    <a:masterClrMapping/>
+  </p:clrMapOvr>
+</p:notes>
+</file>
+
+<file path=ppt/notesSlides/notesSlide5.xml><?xml version="1.0" encoding="utf-8"?>
+<p:notes xmlns:a="http://schemas.openxmlformats.org/drawingml/2006/main" xmlns:r="http://schemas.openxmlformats.org/officeDocument/2006/relationships" xmlns:mc="http://schemas.openxmlformats.org/markup-compatibility/2006" xmlns:mv="urn:schemas-microsoft-com:mac:vml" xmlns:p="http://schemas.openxmlformats.org/presentationml/2006/main" xmlns:c="http://schemas.openxmlformats.org/drawingml/2006/chart" xmlns:dgm="http://schemas.openxmlformats.org/drawingml/2006/diagram" xmlns:o="urn:schemas-microsoft-com:office:office" xmlns:v="urn:schemas-microsoft-com:vml" xmlns:pvml="urn:schemas-microsoft-com:office:powerpoint" xmlns:com="http://schemas.openxmlformats.org/drawingml/2006/compatibility" xmlns:p14="http://schemas.microsoft.com/office/powerpoint/2010/main" xmlns:p15="http://schemas.microsoft.com/office/powerpoint/2012/main" xmlns:ahyp="http://schemas.microsoft.com/office/drawing/2018/hyperlinkcolor" showMasterPhAnim="0" showMasterSp="0">
+  <p:cSld>
+    <p:spTree>
+      <p:nvGrpSpPr>
+        <p:cNvPr id="76" name="Shape 76"/>
+        <p:cNvGrpSpPr/>
+        <p:nvPr/>
+      </p:nvGrpSpPr>
+      <p:grpSpPr>
+        <a:xfrm>
+          <a:off x="0" y="0"/>
+          <a:ext cx="0" cy="0"/>
+          <a:chOff x="0" y="0"/>
+          <a:chExt cx="0" cy="0"/>
+        </a:xfrm>
+      </p:grpSpPr>
+      <p:sp>
+        <p:nvSpPr>
+          <p:cNvPr id="77" name="Google Shape;77;g16b55a7a1f4_0_1186:notes"/>
+          <p:cNvSpPr/>
+          <p:nvPr>
+            <p:ph idx="2" type="sldImg"/>
+          </p:nvPr>
+        </p:nvSpPr>
+        <p:spPr>
+          <a:xfrm>
+            <a:off x="381300" y="685800"/>
+            <a:ext cx="6096000" cy="3429000"/>
+          </a:xfrm>
+          <a:custGeom>
+            <a:rect b="b" l="l" r="r" t="t"/>
+            <a:pathLst>
+              <a:path extrusionOk="0" h="120000" w="120000">
+                <a:moveTo>
+                  <a:pt x="0" y="0"/>
+                </a:moveTo>
+                <a:lnTo>
+                  <a:pt x="120000" y="0"/>
+                </a:lnTo>
+                <a:lnTo>
+                  <a:pt x="120000" y="120000"/>
+                </a:lnTo>
+                <a:lnTo>
+                  <a:pt x="0" y="120000"/>
+                </a:lnTo>
+                <a:close/>
+              </a:path>
+            </a:pathLst>
+          </a:custGeom>
+        </p:spPr>
+      </p:sp>
+      <p:sp>
+        <p:nvSpPr>
+          <p:cNvPr id="78" name="Google Shape;78;g16b55a7a1f4_0_1186:notes"/>
+          <p:cNvSpPr txBox="1"/>
+          <p:nvPr>
+            <p:ph idx="1" type="body"/>
+          </p:nvPr>
+        </p:nvSpPr>
+        <p:spPr>
+          <a:xfrm>
+            <a:off x="685800" y="4343400"/>
+            <a:ext cx="5486400" cy="4114800"/>
+          </a:xfrm>
+          <a:prstGeom prst="rect">
+            <a:avLst/>
+          </a:prstGeom>
+        </p:spPr>
+        <p:txBody>
+          <a:bodyPr anchorCtr="0" anchor="t" bIns="91425" lIns="91425" spcFirstLastPara="1" rIns="91425" wrap="square" tIns="91425">
+            <a:noAutofit/>
+          </a:bodyPr>
+          <a:lstStyle/>
+          <a:p>
+            <a:pPr indent="0" lvl="0" marL="0" rtl="0" algn="l">
+              <a:spcBef>
+                <a:spcPts val="0"/>
+              </a:spcBef>
+              <a:spcAft>
+                <a:spcPts val="0"/>
+              </a:spcAft>
+              <a:buNone/>
+            </a:pPr>
+            <a:r>
+              <a:t/>
+            </a:r>
+            <a:endParaRPr/>
+          </a:p>
+        </p:txBody>
+      </p:sp>
+    </p:spTree>
+  </p:cSld>
+  <p:clrMapOvr>
+    <a:masterClrMapping/>
+  </p:clrMapOvr>
+</p:notes>
+</file>
+
+<file path=ppt/notesSlides/notesSlide6.xml><?xml version="1.0" encoding="utf-8"?>
+<p:notes xmlns:a="http://schemas.openxmlformats.org/drawingml/2006/main" xmlns:r="http://schemas.openxmlformats.org/officeDocument/2006/relationships" xmlns:mc="http://schemas.openxmlformats.org/markup-compatibility/2006" xmlns:mv="urn:schemas-microsoft-com:mac:vml" xmlns:p="http://schemas.openxmlformats.org/presentationml/2006/main" xmlns:c="http://schemas.openxmlformats.org/drawingml/2006/chart" xmlns:dgm="http://schemas.openxmlformats.org/drawingml/2006/diagram" xmlns:o="urn:schemas-microsoft-com:office:office" xmlns:v="urn:schemas-microsoft-com:vml" xmlns:pvml="urn:schemas-microsoft-com:office:powerpoint" xmlns:com="http://schemas.openxmlformats.org/drawingml/2006/compatibility" xmlns:p14="http://schemas.microsoft.com/office/powerpoint/2010/main" xmlns:p15="http://schemas.microsoft.com/office/powerpoint/2012/main" xmlns:ahyp="http://schemas.microsoft.com/office/drawing/2018/hyperlinkcolor" showMasterPhAnim="0" showMasterSp="0">
+  <p:cSld>
+    <p:spTree>
+      <p:nvGrpSpPr>
+        <p:cNvPr id="84" name="Shape 84"/>
+        <p:cNvGrpSpPr/>
+        <p:nvPr/>
+      </p:nvGrpSpPr>
+      <p:grpSpPr>
+        <a:xfrm>
+          <a:off x="0" y="0"/>
+          <a:ext cx="0" cy="0"/>
+          <a:chOff x="0" y="0"/>
+          <a:chExt cx="0" cy="0"/>
+        </a:xfrm>
+      </p:grpSpPr>
+      <p:sp>
+        <p:nvSpPr>
+          <p:cNvPr id="85" name="Google Shape;85;g16b723c71ca_0_0:notes"/>
+          <p:cNvSpPr/>
+          <p:nvPr>
+            <p:ph idx="2" type="sldImg"/>
+          </p:nvPr>
+        </p:nvSpPr>
+        <p:spPr>
+          <a:xfrm>
+            <a:off x="381300" y="685800"/>
+            <a:ext cx="6096000" cy="3429000"/>
+          </a:xfrm>
+          <a:custGeom>
+            <a:rect b="b" l="l" r="r" t="t"/>
+            <a:pathLst>
+              <a:path extrusionOk="0" h="120000" w="120000">
+                <a:moveTo>
+                  <a:pt x="0" y="0"/>
+                </a:moveTo>
+                <a:lnTo>
+                  <a:pt x="120000" y="0"/>
+                </a:lnTo>
+                <a:lnTo>
+                  <a:pt x="120000" y="120000"/>
+                </a:lnTo>
+                <a:lnTo>
+                  <a:pt x="0" y="120000"/>
+                </a:lnTo>
+                <a:close/>
+              </a:path>
+            </a:pathLst>
+          </a:custGeom>
+        </p:spPr>
+      </p:sp>
+      <p:sp>
+        <p:nvSpPr>
+          <p:cNvPr id="86" name="Google Shape;86;g16b723c71ca_0_0:notes"/>
+          <p:cNvSpPr txBox="1"/>
+          <p:nvPr>
+            <p:ph idx="1" type="body"/>
+          </p:nvPr>
+        </p:nvSpPr>
+        <p:spPr>
+          <a:xfrm>
+            <a:off x="685800" y="4343400"/>
+            <a:ext cx="5486400" cy="4114800"/>
+          </a:xfrm>
+          <a:prstGeom prst="rect">
+            <a:avLst/>
+          </a:prstGeom>
+        </p:spPr>
+        <p:txBody>
+          <a:bodyPr anchorCtr="0" anchor="t" bIns="91425" lIns="91425" spcFirstLastPara="1" rIns="91425" wrap="square" tIns="91425">
+            <a:noAutofit/>
+          </a:bodyPr>
+          <a:lstStyle/>
+          <a:p>
+            <a:pPr indent="0" lvl="0" marL="0" rtl="0" algn="l">
+              <a:spcBef>
+                <a:spcPts val="0"/>
+              </a:spcBef>
+              <a:spcAft>
+                <a:spcPts val="0"/>
+              </a:spcAft>
+              <a:buNone/>
+            </a:pPr>
+            <a:r>
+              <a:t/>
+            </a:r>
+            <a:endParaRPr/>
+          </a:p>
+        </p:txBody>
+      </p:sp>
+    </p:spTree>
+  </p:cSld>
+  <p:clrMapOvr>
+    <a:masterClrMapping/>
+  </p:clrMapOvr>
+</p:notes>
+</file>
+
+<file path=ppt/notesSlides/notesSlide7.xml><?xml version="1.0" encoding="utf-8"?>
+<p:notes xmlns:a="http://schemas.openxmlformats.org/drawingml/2006/main" xmlns:r="http://schemas.openxmlformats.org/officeDocument/2006/relationships" xmlns:mc="http://schemas.openxmlformats.org/markup-compatibility/2006" xmlns:mv="urn:schemas-microsoft-com:mac:vml" xmlns:p="http://schemas.openxmlformats.org/presentationml/2006/main" xmlns:c="http://schemas.openxmlformats.org/drawingml/2006/chart" xmlns:dgm="http://schemas.openxmlformats.org/drawingml/2006/diagram" xmlns:o="urn:schemas-microsoft-com:office:office" xmlns:v="urn:schemas-microsoft-com:vml" xmlns:pvml="urn:schemas-microsoft-com:office:powerpoint" xmlns:com="http://schemas.openxmlformats.org/drawingml/2006/compatibility" xmlns:p14="http://schemas.microsoft.com/office/powerpoint/2010/main" xmlns:p15="http://schemas.microsoft.com/office/powerpoint/2012/main" xmlns:ahyp="http://schemas.microsoft.com/office/drawing/2018/hyperlinkcolor" showMasterPhAnim="0" showMasterSp="0">
+  <p:cSld>
+    <p:spTree>
+      <p:nvGrpSpPr>
+        <p:cNvPr id="89" name="Shape 89"/>
+        <p:cNvGrpSpPr/>
+        <p:nvPr/>
+      </p:nvGrpSpPr>
+      <p:grpSpPr>
+        <a:xfrm>
+          <a:off x="0" y="0"/>
+          <a:ext cx="0" cy="0"/>
+          <a:chOff x="0" y="0"/>
+          <a:chExt cx="0" cy="0"/>
+        </a:xfrm>
+      </p:grpSpPr>
+      <p:sp>
+        <p:nvSpPr>
+          <p:cNvPr id="90" name="Google Shape;90;g16b55a7a1f4_0_1192:notes"/>
+          <p:cNvSpPr/>
+          <p:nvPr>
+            <p:ph idx="2" type="sldImg"/>
+          </p:nvPr>
+        </p:nvSpPr>
+        <p:spPr>
+          <a:xfrm>
+            <a:off x="381300" y="685800"/>
+            <a:ext cx="6096000" cy="3429000"/>
+          </a:xfrm>
+          <a:custGeom>
+            <a:rect b="b" l="l" r="r" t="t"/>
+            <a:pathLst>
+              <a:path extrusionOk="0" h="120000" w="120000">
+                <a:moveTo>
+                  <a:pt x="0" y="0"/>
+                </a:moveTo>
+                <a:lnTo>
+                  <a:pt x="120000" y="0"/>
+                </a:lnTo>
+                <a:lnTo>
+                  <a:pt x="120000" y="120000"/>
+                </a:lnTo>
+                <a:lnTo>
+                  <a:pt x="0" y="120000"/>
+                </a:lnTo>
+                <a:close/>
+              </a:path>
+            </a:pathLst>
+          </a:custGeom>
+        </p:spPr>
+      </p:sp>
+      <p:sp>
+        <p:nvSpPr>
+          <p:cNvPr id="91" name="Google Shape;91;g16b55a7a1f4_0_1192:notes"/>
           <p:cNvSpPr txBox="1"/>
           <p:nvPr>
             <p:ph idx="1" type="body"/>
@@ -6236,6 +6536,578 @@
         </p:nvSpPr>
         <p:spPr>
           <a:xfrm>
+            <a:off x="311700" y="445025"/>
+            <a:ext cx="8520600" cy="572700"/>
+          </a:xfrm>
+          <a:prstGeom prst="rect">
+            <a:avLst/>
+          </a:prstGeom>
+        </p:spPr>
+        <p:txBody>
+          <a:bodyPr anchorCtr="0" anchor="t" bIns="91425" lIns="91425" spcFirstLastPara="1" rIns="91425" wrap="square" tIns="91425">
+            <a:normAutofit fontScale="90000"/>
+          </a:bodyPr>
+          <a:lstStyle/>
+          <a:p>
+            <a:pPr indent="0" lvl="0" marL="0" rtl="0" algn="l">
+              <a:spcBef>
+                <a:spcPts val="0"/>
+              </a:spcBef>
+              <a:spcAft>
+                <a:spcPts val="0"/>
+              </a:spcAft>
+              <a:buNone/>
+            </a:pPr>
+            <a:r>
+              <a:rPr lang="en-GB"/>
+              <a:t>European Union password guidelines</a:t>
+            </a:r>
+            <a:endParaRPr/>
+          </a:p>
+        </p:txBody>
+      </p:sp>
+      <p:sp>
+        <p:nvSpPr>
+          <p:cNvPr id="68" name="Google Shape;68;p15"/>
+          <p:cNvSpPr txBox="1"/>
+          <p:nvPr>
+            <p:ph idx="1" type="body"/>
+          </p:nvPr>
+        </p:nvSpPr>
+        <p:spPr>
+          <a:xfrm>
+            <a:off x="311700" y="1152475"/>
+            <a:ext cx="8520600" cy="3416400"/>
+          </a:xfrm>
+          <a:prstGeom prst="rect">
+            <a:avLst/>
+          </a:prstGeom>
+        </p:spPr>
+        <p:txBody>
+          <a:bodyPr anchorCtr="0" anchor="t" bIns="91425" lIns="91425" spcFirstLastPara="1" rIns="91425" wrap="square" tIns="91425">
+            <a:normAutofit lnSpcReduction="10000"/>
+          </a:bodyPr>
+          <a:lstStyle/>
+          <a:p>
+            <a:pPr indent="0" lvl="0" marL="0" rtl="0" algn="l">
+              <a:spcBef>
+                <a:spcPts val="0"/>
+              </a:spcBef>
+              <a:spcAft>
+                <a:spcPts val="0"/>
+              </a:spcAft>
+              <a:buNone/>
+            </a:pPr>
+            <a:r>
+              <a:rPr lang="en-GB" sz="1700"/>
+              <a:t>Complexity requirements for "strong passwords" are based on the following rules:</a:t>
+            </a:r>
+            <a:endParaRPr sz="1700"/>
+          </a:p>
+          <a:p>
+            <a:pPr indent="-336550" lvl="0" marL="457200" rtl="0" algn="l">
+              <a:spcBef>
+                <a:spcPts val="1200"/>
+              </a:spcBef>
+              <a:spcAft>
+                <a:spcPts val="0"/>
+              </a:spcAft>
+              <a:buSzPts val="1700"/>
+              <a:buChar char="●"/>
+            </a:pPr>
+            <a:r>
+              <a:rPr lang="en-GB" sz="1700"/>
+              <a:t>The password is between 8-18 characters long</a:t>
+            </a:r>
+            <a:endParaRPr sz="1700"/>
+          </a:p>
+          <a:p>
+            <a:pPr indent="-336550" lvl="0" marL="457200" rtl="0" algn="l">
+              <a:spcBef>
+                <a:spcPts val="0"/>
+              </a:spcBef>
+              <a:spcAft>
+                <a:spcPts val="0"/>
+              </a:spcAft>
+              <a:buSzPts val="1700"/>
+              <a:buChar char="●"/>
+            </a:pPr>
+            <a:r>
+              <a:rPr lang="en-GB" sz="1700"/>
+              <a:t>The password contains characters from 3 of the following 4 categories:</a:t>
+            </a:r>
+            <a:endParaRPr sz="1700"/>
+          </a:p>
+          <a:p>
+            <a:pPr indent="-336550" lvl="1" marL="914400" rtl="0" algn="l">
+              <a:spcBef>
+                <a:spcPts val="0"/>
+              </a:spcBef>
+              <a:spcAft>
+                <a:spcPts val="0"/>
+              </a:spcAft>
+              <a:buSzPts val="1700"/>
+              <a:buChar char="○"/>
+            </a:pPr>
+            <a:r>
+              <a:rPr lang="en-GB" sz="1700"/>
+              <a:t>standard uppercase characters (A - Z)</a:t>
+            </a:r>
+            <a:endParaRPr sz="1700"/>
+          </a:p>
+          <a:p>
+            <a:pPr indent="-336550" lvl="1" marL="914400" rtl="0" algn="l">
+              <a:spcBef>
+                <a:spcPts val="0"/>
+              </a:spcBef>
+              <a:spcAft>
+                <a:spcPts val="0"/>
+              </a:spcAft>
+              <a:buSzPts val="1700"/>
+              <a:buChar char="○"/>
+            </a:pPr>
+            <a:r>
+              <a:rPr lang="en-GB" sz="1700"/>
+              <a:t>standard lowercase characters (a - z)</a:t>
+            </a:r>
+            <a:endParaRPr sz="1700"/>
+          </a:p>
+          <a:p>
+            <a:pPr indent="-336550" lvl="1" marL="914400" rtl="0" algn="l">
+              <a:spcBef>
+                <a:spcPts val="0"/>
+              </a:spcBef>
+              <a:spcAft>
+                <a:spcPts val="0"/>
+              </a:spcAft>
+              <a:buSzPts val="1700"/>
+              <a:buChar char="○"/>
+            </a:pPr>
+            <a:r>
+              <a:rPr lang="en-GB" sz="1700"/>
+              <a:t>numbers (0 - 9)</a:t>
+            </a:r>
+            <a:endParaRPr sz="1700"/>
+          </a:p>
+          <a:p>
+            <a:pPr indent="-336550" lvl="1" marL="914400" rtl="0" algn="l">
+              <a:spcBef>
+                <a:spcPts val="0"/>
+              </a:spcBef>
+              <a:spcAft>
+                <a:spcPts val="0"/>
+              </a:spcAft>
+              <a:buSzPts val="1700"/>
+              <a:buChar char="○"/>
+            </a:pPr>
+            <a:r>
+              <a:rPr lang="en-GB" sz="1700"/>
+              <a:t>symbols: only from among ! % - _ + = [ ] { } : , . ? &lt; &gt; ( ) ;</a:t>
+            </a:r>
+            <a:endParaRPr sz="1700"/>
+          </a:p>
+          <a:p>
+            <a:pPr indent="-336550" lvl="0" marL="457200" rtl="0" algn="l">
+              <a:spcBef>
+                <a:spcPts val="0"/>
+              </a:spcBef>
+              <a:spcAft>
+                <a:spcPts val="0"/>
+              </a:spcAft>
+              <a:buSzPts val="1700"/>
+              <a:buChar char="●"/>
+            </a:pPr>
+            <a:r>
+              <a:rPr lang="en-GB" sz="1700"/>
+              <a:t>The password does not contain your account name or any part of your full name</a:t>
+            </a:r>
+            <a:endParaRPr sz="1700"/>
+          </a:p>
+          <a:p>
+            <a:pPr indent="0" lvl="0" marL="0" rtl="0" algn="l">
+              <a:spcBef>
+                <a:spcPts val="1200"/>
+              </a:spcBef>
+              <a:spcAft>
+                <a:spcPts val="0"/>
+              </a:spcAft>
+              <a:buNone/>
+            </a:pPr>
+            <a:r>
+              <a:t/>
+            </a:r>
+            <a:endParaRPr sz="1700"/>
+          </a:p>
+          <a:p>
+            <a:pPr indent="0" lvl="0" marL="0" rtl="0" algn="l">
+              <a:spcBef>
+                <a:spcPts val="1200"/>
+              </a:spcBef>
+              <a:spcAft>
+                <a:spcPts val="1200"/>
+              </a:spcAft>
+              <a:buNone/>
+            </a:pPr>
+            <a:r>
+              <a:rPr lang="en-GB" sz="1483"/>
+              <a:t>Source: </a:t>
+            </a:r>
+            <a:r>
+              <a:rPr lang="en-GB" sz="1383" u="sng">
+                <a:solidFill>
+                  <a:schemeClr val="hlink"/>
+                </a:solidFill>
+                <a:hlinkClick r:id="rId3"/>
+              </a:rPr>
+              <a:t>h</a:t>
+            </a:r>
+            <a:r>
+              <a:rPr lang="en-GB" sz="1383" u="sng">
+                <a:solidFill>
+                  <a:schemeClr val="hlink"/>
+                </a:solidFill>
+                <a:hlinkClick r:id="rId4"/>
+              </a:rPr>
+              <a:t>ttps://eui.eu/ServicesAndAdmin/ComputingService/PolicyDocuments/StrongPasswordPolicy</a:t>
+            </a:r>
+            <a:endParaRPr sz="1383"/>
+          </a:p>
+        </p:txBody>
+      </p:sp>
+    </p:spTree>
+  </p:cSld>
+  <p:clrMapOvr>
+    <a:masterClrMapping/>
+  </p:clrMapOvr>
+</p:sld>
+</file>
+
+<file path=ppt/slides/slide4.xml><?xml version="1.0" encoding="utf-8"?>
+<p:sld xmlns:a="http://schemas.openxmlformats.org/drawingml/2006/main" xmlns:r="http://schemas.openxmlformats.org/officeDocument/2006/relationships" xmlns:mc="http://schemas.openxmlformats.org/markup-compatibility/2006" xmlns:mv="urn:schemas-microsoft-com:mac:vml" xmlns:p="http://schemas.openxmlformats.org/presentationml/2006/main" xmlns:c="http://schemas.openxmlformats.org/drawingml/2006/chart" xmlns:dgm="http://schemas.openxmlformats.org/drawingml/2006/diagram" xmlns:o="urn:schemas-microsoft-com:office:office" xmlns:v="urn:schemas-microsoft-com:vml" xmlns:pvml="urn:schemas-microsoft-com:office:powerpoint" xmlns:com="http://schemas.openxmlformats.org/drawingml/2006/compatibility" xmlns:p14="http://schemas.microsoft.com/office/powerpoint/2010/main" xmlns:p15="http://schemas.microsoft.com/office/powerpoint/2012/main" xmlns:ahyp="http://schemas.microsoft.com/office/drawing/2018/hyperlinkcolor">
+  <p:cSld>
+    <p:spTree>
+      <p:nvGrpSpPr>
+        <p:cNvPr id="72" name="Shape 72"/>
+        <p:cNvGrpSpPr/>
+        <p:nvPr/>
+      </p:nvGrpSpPr>
+      <p:grpSpPr>
+        <a:xfrm>
+          <a:off x="0" y="0"/>
+          <a:ext cx="0" cy="0"/>
+          <a:chOff x="0" y="0"/>
+          <a:chExt cx="0" cy="0"/>
+        </a:xfrm>
+      </p:grpSpPr>
+      <p:sp>
+        <p:nvSpPr>
+          <p:cNvPr id="73" name="Google Shape;73;p16"/>
+          <p:cNvSpPr txBox="1"/>
+          <p:nvPr>
+            <p:ph type="title"/>
+          </p:nvPr>
+        </p:nvSpPr>
+        <p:spPr>
+          <a:xfrm>
+            <a:off x="311700" y="445025"/>
+            <a:ext cx="8520600" cy="572700"/>
+          </a:xfrm>
+          <a:prstGeom prst="rect">
+            <a:avLst/>
+          </a:prstGeom>
+        </p:spPr>
+        <p:txBody>
+          <a:bodyPr anchorCtr="0" anchor="t" bIns="91425" lIns="91425" spcFirstLastPara="1" rIns="91425" wrap="square" tIns="91425">
+            <a:normAutofit fontScale="90000"/>
+          </a:bodyPr>
+          <a:lstStyle/>
+          <a:p>
+            <a:pPr indent="0" lvl="0" marL="0" rtl="0" algn="l">
+              <a:spcBef>
+                <a:spcPts val="0"/>
+              </a:spcBef>
+              <a:spcAft>
+                <a:spcPts val="0"/>
+              </a:spcAft>
+              <a:buNone/>
+            </a:pPr>
+            <a:r>
+              <a:rPr lang="en-GB"/>
+              <a:t>Algorithm we used</a:t>
+            </a:r>
+            <a:endParaRPr/>
+          </a:p>
+        </p:txBody>
+      </p:sp>
+      <p:sp>
+        <p:nvSpPr>
+          <p:cNvPr id="74" name="Google Shape;74;p16"/>
+          <p:cNvSpPr txBox="1"/>
+          <p:nvPr>
+            <p:ph idx="1" type="body"/>
+          </p:nvPr>
+        </p:nvSpPr>
+        <p:spPr>
+          <a:xfrm>
+            <a:off x="98050" y="1144575"/>
+            <a:ext cx="4721100" cy="3025500"/>
+          </a:xfrm>
+          <a:prstGeom prst="rect">
+            <a:avLst/>
+          </a:prstGeom>
+        </p:spPr>
+        <p:txBody>
+          <a:bodyPr anchorCtr="0" anchor="t" bIns="91425" lIns="91425" spcFirstLastPara="1" rIns="91425" wrap="square" tIns="91425">
+            <a:normAutofit/>
+          </a:bodyPr>
+          <a:lstStyle/>
+          <a:p>
+            <a:pPr indent="-323850" lvl="0" marL="457200" rtl="0" algn="l">
+              <a:lnSpc>
+                <a:spcPct val="100000"/>
+              </a:lnSpc>
+              <a:spcBef>
+                <a:spcPts val="0"/>
+              </a:spcBef>
+              <a:spcAft>
+                <a:spcPts val="0"/>
+              </a:spcAft>
+              <a:buClr>
+                <a:schemeClr val="dk1"/>
+              </a:buClr>
+              <a:buSzPts val="1500"/>
+              <a:buChar char="-"/>
+            </a:pPr>
+            <a:r>
+              <a:rPr lang="en-GB" sz="1700"/>
+              <a:t>Automated check if input follow format</a:t>
+            </a:r>
+            <a:endParaRPr sz="1700"/>
+          </a:p>
+          <a:p>
+            <a:pPr indent="-336550" lvl="0" marL="457200" rtl="0" algn="l">
+              <a:lnSpc>
+                <a:spcPct val="100000"/>
+              </a:lnSpc>
+              <a:spcBef>
+                <a:spcPts val="0"/>
+              </a:spcBef>
+              <a:spcAft>
+                <a:spcPts val="0"/>
+              </a:spcAft>
+              <a:buClr>
+                <a:srgbClr val="000000"/>
+              </a:buClr>
+              <a:buSzPts val="1700"/>
+              <a:buChar char="-"/>
+            </a:pPr>
+            <a:r>
+              <a:t/>
+            </a:r>
+            <a:endParaRPr sz="1700"/>
+          </a:p>
+          <a:p>
+            <a:pPr indent="-323850" lvl="0" marL="457200" rtl="0" algn="l">
+              <a:lnSpc>
+                <a:spcPct val="100000"/>
+              </a:lnSpc>
+              <a:spcBef>
+                <a:spcPts val="0"/>
+              </a:spcBef>
+              <a:spcAft>
+                <a:spcPts val="0"/>
+              </a:spcAft>
+              <a:buClr>
+                <a:schemeClr val="dk1"/>
+              </a:buClr>
+              <a:buSzPts val="1500"/>
+              <a:buChar char="-"/>
+            </a:pPr>
+            <a:r>
+              <a:rPr lang="en-GB" sz="1700"/>
+              <a:t>Randomised capitalisation of word letters</a:t>
+            </a:r>
+            <a:endParaRPr sz="1700"/>
+          </a:p>
+          <a:p>
+            <a:pPr indent="-336550" lvl="0" marL="457200" rtl="0" algn="l">
+              <a:lnSpc>
+                <a:spcPct val="100000"/>
+              </a:lnSpc>
+              <a:spcBef>
+                <a:spcPts val="0"/>
+              </a:spcBef>
+              <a:spcAft>
+                <a:spcPts val="0"/>
+              </a:spcAft>
+              <a:buClr>
+                <a:srgbClr val="000000"/>
+              </a:buClr>
+              <a:buSzPts val="1700"/>
+              <a:buChar char="-"/>
+            </a:pPr>
+            <a:r>
+              <a:t/>
+            </a:r>
+            <a:endParaRPr sz="1700"/>
+          </a:p>
+          <a:p>
+            <a:pPr indent="-323850" lvl="0" marL="457200" rtl="0" algn="l">
+              <a:lnSpc>
+                <a:spcPct val="100000"/>
+              </a:lnSpc>
+              <a:spcBef>
+                <a:spcPts val="0"/>
+              </a:spcBef>
+              <a:spcAft>
+                <a:spcPts val="0"/>
+              </a:spcAft>
+              <a:buClr>
+                <a:schemeClr val="dk1"/>
+              </a:buClr>
+              <a:buSzPts val="1500"/>
+              <a:buChar char="-"/>
+            </a:pPr>
+            <a:r>
+              <a:rPr lang="en-GB" sz="1700"/>
+              <a:t>Alternation of the string following format:</a:t>
+            </a:r>
+            <a:endParaRPr sz="1700"/>
+          </a:p>
+          <a:p>
+            <a:pPr indent="-323850" lvl="1" marL="914400" rtl="0" algn="l">
+              <a:lnSpc>
+                <a:spcPct val="100000"/>
+              </a:lnSpc>
+              <a:spcBef>
+                <a:spcPts val="0"/>
+              </a:spcBef>
+              <a:spcAft>
+                <a:spcPts val="0"/>
+              </a:spcAft>
+              <a:buClr>
+                <a:schemeClr val="dk1"/>
+              </a:buClr>
+              <a:buSzPts val="1500"/>
+              <a:buChar char="-"/>
+            </a:pPr>
+            <a:r>
+              <a:rPr lang="en-GB" sz="1700"/>
+              <a:t>1 letter of word</a:t>
+            </a:r>
+            <a:endParaRPr sz="1700"/>
+          </a:p>
+          <a:p>
+            <a:pPr indent="-323850" lvl="1" marL="914400" rtl="0" algn="l">
+              <a:lnSpc>
+                <a:spcPct val="100000"/>
+              </a:lnSpc>
+              <a:spcBef>
+                <a:spcPts val="0"/>
+              </a:spcBef>
+              <a:spcAft>
+                <a:spcPts val="0"/>
+              </a:spcAft>
+              <a:buClr>
+                <a:schemeClr val="dk1"/>
+              </a:buClr>
+              <a:buSzPts val="1500"/>
+              <a:buChar char="-"/>
+            </a:pPr>
+            <a:r>
+              <a:rPr lang="en-GB" sz="1700"/>
+              <a:t>1 digit of number</a:t>
+            </a:r>
+            <a:endParaRPr sz="1700"/>
+          </a:p>
+          <a:p>
+            <a:pPr indent="-323850" lvl="1" marL="914400" rtl="0" algn="l">
+              <a:lnSpc>
+                <a:spcPct val="100000"/>
+              </a:lnSpc>
+              <a:spcBef>
+                <a:spcPts val="0"/>
+              </a:spcBef>
+              <a:spcAft>
+                <a:spcPts val="0"/>
+              </a:spcAft>
+              <a:buClr>
+                <a:schemeClr val="dk1"/>
+              </a:buClr>
+              <a:buSzPts val="1500"/>
+              <a:buChar char="-"/>
+            </a:pPr>
+            <a:r>
+              <a:rPr lang="en-GB" sz="1700"/>
+              <a:t>1 additional special character (depending on the lengths of the word might be more by the end)</a:t>
+            </a:r>
+            <a:endParaRPr sz="1500"/>
+          </a:p>
+        </p:txBody>
+      </p:sp>
+      <p:pic>
+        <p:nvPicPr>
+          <p:cNvPr id="75" name="Google Shape;75;p16"/>
+          <p:cNvPicPr preferRelativeResize="0"/>
+          <p:nvPr/>
+        </p:nvPicPr>
+        <p:blipFill>
+          <a:blip r:embed="rId3">
+            <a:alphaModFix/>
+          </a:blip>
+          <a:stretch>
+            <a:fillRect/>
+          </a:stretch>
+        </p:blipFill>
+        <p:spPr>
+          <a:xfrm>
+            <a:off x="5135675" y="827275"/>
+            <a:ext cx="3620050" cy="3047650"/>
+          </a:xfrm>
+          <a:prstGeom prst="rect">
+            <a:avLst/>
+          </a:prstGeom>
+          <a:noFill/>
+          <a:ln>
+            <a:noFill/>
+          </a:ln>
+        </p:spPr>
+      </p:pic>
+    </p:spTree>
+  </p:cSld>
+  <p:clrMapOvr>
+    <a:masterClrMapping/>
+  </p:clrMapOvr>
+</p:sld>
+</file>
+
+<file path=ppt/slides/slide5.xml><?xml version="1.0" encoding="utf-8"?>
+<p:sld xmlns:a="http://schemas.openxmlformats.org/drawingml/2006/main" xmlns:r="http://schemas.openxmlformats.org/officeDocument/2006/relationships" xmlns:mc="http://schemas.openxmlformats.org/markup-compatibility/2006" xmlns:mv="urn:schemas-microsoft-com:mac:vml" xmlns:p="http://schemas.openxmlformats.org/presentationml/2006/main" xmlns:c="http://schemas.openxmlformats.org/drawingml/2006/chart" xmlns:dgm="http://schemas.openxmlformats.org/drawingml/2006/diagram" xmlns:o="urn:schemas-microsoft-com:office:office" xmlns:v="urn:schemas-microsoft-com:vml" xmlns:pvml="urn:schemas-microsoft-com:office:powerpoint" xmlns:com="http://schemas.openxmlformats.org/drawingml/2006/compatibility" xmlns:p14="http://schemas.microsoft.com/office/powerpoint/2010/main" xmlns:p15="http://schemas.microsoft.com/office/powerpoint/2012/main" xmlns:ahyp="http://schemas.microsoft.com/office/drawing/2018/hyperlinkcolor">
+  <p:cSld>
+    <p:spTree>
+      <p:nvGrpSpPr>
+        <p:cNvPr id="79" name="Shape 79"/>
+        <p:cNvGrpSpPr/>
+        <p:nvPr/>
+      </p:nvGrpSpPr>
+      <p:grpSpPr>
+        <a:xfrm>
+          <a:off x="0" y="0"/>
+          <a:ext cx="0" cy="0"/>
+          <a:chOff x="0" y="0"/>
+          <a:chExt cx="0" cy="0"/>
+        </a:xfrm>
+      </p:grpSpPr>
+      <p:sp>
+        <p:nvSpPr>
+          <p:cNvPr id="80" name="Google Shape;80;p17"/>
+          <p:cNvSpPr txBox="1"/>
+          <p:nvPr>
+            <p:ph type="title"/>
+          </p:nvPr>
+        </p:nvSpPr>
+        <p:spPr>
+          <a:xfrm>
             <a:off x="253375" y="85025"/>
             <a:ext cx="4717500" cy="839100"/>
           </a:xfrm>
@@ -6260,43 +7132,15 @@
             </a:pPr>
             <a:r>
               <a:rPr lang="en-GB"/>
-              <a:t>How does our code works?</a:t>
+              <a:t>Input / Output</a:t>
             </a:r>
             <a:endParaRPr/>
           </a:p>
         </p:txBody>
       </p:sp>
-      <p:pic>
-        <p:nvPicPr>
-          <p:cNvPr id="68" name="Google Shape;68;p15"/>
-          <p:cNvPicPr preferRelativeResize="0"/>
-          <p:nvPr/>
-        </p:nvPicPr>
-        <p:blipFill>
-          <a:blip r:embed="rId3">
-            <a:alphaModFix/>
-          </a:blip>
-          <a:stretch>
-            <a:fillRect/>
-          </a:stretch>
-        </p:blipFill>
-        <p:spPr>
-          <a:xfrm>
-            <a:off x="5097325" y="25888"/>
-            <a:ext cx="4046674" cy="5091724"/>
-          </a:xfrm>
-          <a:prstGeom prst="rect">
-            <a:avLst/>
-          </a:prstGeom>
-          <a:noFill/>
-          <a:ln>
-            <a:noFill/>
-          </a:ln>
-        </p:spPr>
-      </p:pic>
       <p:sp>
         <p:nvSpPr>
-          <p:cNvPr id="69" name="Google Shape;69;p15"/>
+          <p:cNvPr id="81" name="Google Shape;81;p17"/>
           <p:cNvSpPr txBox="1"/>
           <p:nvPr/>
         </p:nvSpPr>
@@ -6337,14 +7181,14 @@
       </p:sp>
       <p:sp>
         <p:nvSpPr>
-          <p:cNvPr id="70" name="Google Shape;70;p15"/>
+          <p:cNvPr id="82" name="Google Shape;82;p17"/>
           <p:cNvSpPr txBox="1"/>
           <p:nvPr/>
         </p:nvSpPr>
         <p:spPr>
           <a:xfrm>
-            <a:off x="184775" y="573925"/>
-            <a:ext cx="4650000" cy="5079600"/>
+            <a:off x="723750" y="1078650"/>
+            <a:ext cx="3399000" cy="2986200"/>
           </a:xfrm>
           <a:prstGeom prst="rect">
             <a:avLst/>
@@ -6370,16 +7214,177 @@
               <a:buNone/>
             </a:pPr>
             <a:r>
-              <a:rPr lang="en-GB" sz="1600">
+              <a:rPr lang="en-GB" sz="1700">
                 <a:solidFill>
                   <a:schemeClr val="lt2"/>
                 </a:solidFill>
               </a:rPr>
               <a:t>User INPUT:</a:t>
             </a:r>
-            <a:endParaRPr sz="1600">
+            <a:endParaRPr sz="1700">
               <a:solidFill>
                 <a:schemeClr val="lt2"/>
+              </a:solidFill>
+            </a:endParaRPr>
+          </a:p>
+          <a:p>
+            <a:pPr indent="0" lvl="0" marL="0" rtl="0" algn="l">
+              <a:spcBef>
+                <a:spcPts val="0"/>
+              </a:spcBef>
+              <a:spcAft>
+                <a:spcPts val="0"/>
+              </a:spcAft>
+              <a:buNone/>
+            </a:pPr>
+            <a:r>
+              <a:t/>
+            </a:r>
+            <a:endParaRPr sz="1700">
+              <a:solidFill>
+                <a:schemeClr val="lt2"/>
+              </a:solidFill>
+            </a:endParaRPr>
+          </a:p>
+          <a:p>
+            <a:pPr indent="0" lvl="0" marL="0" rtl="0" algn="l">
+              <a:spcBef>
+                <a:spcPts val="0"/>
+              </a:spcBef>
+              <a:spcAft>
+                <a:spcPts val="0"/>
+              </a:spcAft>
+              <a:buNone/>
+            </a:pPr>
+            <a:r>
+              <a:rPr b="1" lang="en-GB" sz="1700">
+                <a:solidFill>
+                  <a:schemeClr val="dk1"/>
+                </a:solidFill>
+              </a:rPr>
+              <a:t>Word : damian</a:t>
+            </a:r>
+            <a:endParaRPr b="1" sz="1700">
+              <a:solidFill>
+                <a:schemeClr val="dk1"/>
+              </a:solidFill>
+            </a:endParaRPr>
+          </a:p>
+          <a:p>
+            <a:pPr indent="0" lvl="0" marL="0" rtl="0" algn="l">
+              <a:spcBef>
+                <a:spcPts val="0"/>
+              </a:spcBef>
+              <a:spcAft>
+                <a:spcPts val="0"/>
+              </a:spcAft>
+              <a:buNone/>
+            </a:pPr>
+            <a:r>
+              <a:rPr b="1" lang="en-GB" sz="1700">
+                <a:solidFill>
+                  <a:schemeClr val="dk1"/>
+                </a:solidFill>
+              </a:rPr>
+              <a:t>Year : 1989</a:t>
+            </a:r>
+            <a:endParaRPr b="1" sz="1700">
+              <a:solidFill>
+                <a:schemeClr val="dk1"/>
+              </a:solidFill>
+            </a:endParaRPr>
+          </a:p>
+          <a:p>
+            <a:pPr indent="0" lvl="0" marL="0" rtl="0" algn="l">
+              <a:spcBef>
+                <a:spcPts val="0"/>
+              </a:spcBef>
+              <a:spcAft>
+                <a:spcPts val="0"/>
+              </a:spcAft>
+              <a:buNone/>
+            </a:pPr>
+            <a:r>
+              <a:t/>
+            </a:r>
+            <a:endParaRPr sz="1700">
+              <a:solidFill>
+                <a:schemeClr val="lt2"/>
+              </a:solidFill>
+            </a:endParaRPr>
+          </a:p>
+          <a:p>
+            <a:pPr indent="0" lvl="0" marL="0" rtl="0" algn="l">
+              <a:spcBef>
+                <a:spcPts val="0"/>
+              </a:spcBef>
+              <a:spcAft>
+                <a:spcPts val="0"/>
+              </a:spcAft>
+              <a:buNone/>
+            </a:pPr>
+            <a:r>
+              <a:rPr lang="en-GB" sz="1700">
+                <a:solidFill>
+                  <a:schemeClr val="lt2"/>
+                </a:solidFill>
+              </a:rPr>
+              <a:t>Python OUTPUT (password):</a:t>
+            </a:r>
+            <a:endParaRPr sz="1700">
+              <a:solidFill>
+                <a:schemeClr val="lt2"/>
+              </a:solidFill>
+            </a:endParaRPr>
+          </a:p>
+          <a:p>
+            <a:pPr indent="0" lvl="0" marL="0" rtl="0" algn="l">
+              <a:spcBef>
+                <a:spcPts val="0"/>
+              </a:spcBef>
+              <a:spcAft>
+                <a:spcPts val="0"/>
+              </a:spcAft>
+              <a:buNone/>
+            </a:pPr>
+            <a:r>
+              <a:t/>
+            </a:r>
+            <a:endParaRPr sz="1700">
+              <a:solidFill>
+                <a:schemeClr val="lt2"/>
+              </a:solidFill>
+            </a:endParaRPr>
+          </a:p>
+          <a:p>
+            <a:pPr indent="0" lvl="0" marL="0" rtl="0" algn="l">
+              <a:spcBef>
+                <a:spcPts val="0"/>
+              </a:spcBef>
+              <a:spcAft>
+                <a:spcPts val="0"/>
+              </a:spcAft>
+              <a:buNone/>
+            </a:pPr>
+            <a:r>
+              <a:rPr lang="en-GB" sz="1700">
+                <a:solidFill>
+                  <a:schemeClr val="lt2"/>
+                </a:solidFill>
+              </a:rPr>
+              <a:t> </a:t>
+            </a:r>
+            <a:r>
+              <a:rPr b="1" lang="en-GB" sz="1700">
+                <a:solidFill>
+                  <a:schemeClr val="dk1"/>
+                </a:solidFill>
+              </a:rPr>
+              <a:t>D 1 \ A 9 / M 8 : I 9 *a ? N &lt; &gt;</a:t>
+            </a:r>
+            <a:endParaRPr b="1" sz="1700">
+              <a:solidFill>
+                <a:schemeClr val="dk1"/>
               </a:solidFill>
             </a:endParaRPr>
           </a:p>
@@ -6413,391 +7418,6 @@
               <a:buNone/>
             </a:pPr>
             <a:r>
-              <a:rPr b="1" lang="en-GB" sz="1600">
-                <a:solidFill>
-                  <a:schemeClr val="dk1"/>
-                </a:solidFill>
-              </a:rPr>
-              <a:t>Word : damian</a:t>
-            </a:r>
-            <a:endParaRPr b="1" sz="1600">
-              <a:solidFill>
-                <a:schemeClr val="dk1"/>
-              </a:solidFill>
-            </a:endParaRPr>
-          </a:p>
-          <a:p>
-            <a:pPr indent="0" lvl="0" marL="0" rtl="0" algn="l">
-              <a:spcBef>
-                <a:spcPts val="0"/>
-              </a:spcBef>
-              <a:spcAft>
-                <a:spcPts val="0"/>
-              </a:spcAft>
-              <a:buNone/>
-            </a:pPr>
-            <a:r>
-              <a:rPr b="1" lang="en-GB" sz="1600">
-                <a:solidFill>
-                  <a:schemeClr val="dk1"/>
-                </a:solidFill>
-              </a:rPr>
-              <a:t>Year : 1989</a:t>
-            </a:r>
-            <a:endParaRPr b="1" sz="1600">
-              <a:solidFill>
-                <a:schemeClr val="dk1"/>
-              </a:solidFill>
-            </a:endParaRPr>
-          </a:p>
-          <a:p>
-            <a:pPr indent="0" lvl="0" marL="0" rtl="0" algn="l">
-              <a:spcBef>
-                <a:spcPts val="0"/>
-              </a:spcBef>
-              <a:spcAft>
-                <a:spcPts val="0"/>
-              </a:spcAft>
-              <a:buNone/>
-            </a:pPr>
-            <a:r>
-              <a:t/>
-            </a:r>
-            <a:endParaRPr sz="1600">
-              <a:solidFill>
-                <a:schemeClr val="lt2"/>
-              </a:solidFill>
-            </a:endParaRPr>
-          </a:p>
-          <a:p>
-            <a:pPr indent="0" lvl="0" marL="0" rtl="0" algn="l">
-              <a:spcBef>
-                <a:spcPts val="0"/>
-              </a:spcBef>
-              <a:spcAft>
-                <a:spcPts val="0"/>
-              </a:spcAft>
-              <a:buNone/>
-            </a:pPr>
-            <a:r>
-              <a:rPr lang="en-GB" sz="1600">
-                <a:solidFill>
-                  <a:schemeClr val="lt2"/>
-                </a:solidFill>
-              </a:rPr>
-              <a:t>Python OUTPUT (password):</a:t>
-            </a:r>
-            <a:endParaRPr sz="1600">
-              <a:solidFill>
-                <a:schemeClr val="lt2"/>
-              </a:solidFill>
-            </a:endParaRPr>
-          </a:p>
-          <a:p>
-            <a:pPr indent="0" lvl="0" marL="0" rtl="0" algn="l">
-              <a:spcBef>
-                <a:spcPts val="0"/>
-              </a:spcBef>
-              <a:spcAft>
-                <a:spcPts val="0"/>
-              </a:spcAft>
-              <a:buNone/>
-            </a:pPr>
-            <a:r>
-              <a:t/>
-            </a:r>
-            <a:endParaRPr sz="1600">
-              <a:solidFill>
-                <a:schemeClr val="lt2"/>
-              </a:solidFill>
-            </a:endParaRPr>
-          </a:p>
-          <a:p>
-            <a:pPr indent="0" lvl="0" marL="0" rtl="0" algn="l">
-              <a:spcBef>
-                <a:spcPts val="0"/>
-              </a:spcBef>
-              <a:spcAft>
-                <a:spcPts val="0"/>
-              </a:spcAft>
-              <a:buNone/>
-            </a:pPr>
-            <a:r>
-              <a:rPr lang="en-GB" sz="1600">
-                <a:solidFill>
-                  <a:schemeClr val="lt2"/>
-                </a:solidFill>
-              </a:rPr>
-              <a:t> </a:t>
-            </a:r>
-            <a:r>
-              <a:rPr b="1" lang="en-GB" sz="1600">
-                <a:solidFill>
-                  <a:schemeClr val="dk1"/>
-                </a:solidFill>
-              </a:rPr>
-              <a:t>D 1 \ A 9 / M 8 : I 9 *a ? N &lt; &gt;</a:t>
-            </a:r>
-            <a:endParaRPr b="1" sz="1600">
-              <a:solidFill>
-                <a:schemeClr val="dk1"/>
-              </a:solidFill>
-            </a:endParaRPr>
-          </a:p>
-          <a:p>
-            <a:pPr indent="0" lvl="0" marL="0" rtl="0" algn="l">
-              <a:spcBef>
-                <a:spcPts val="0"/>
-              </a:spcBef>
-              <a:spcAft>
-                <a:spcPts val="0"/>
-              </a:spcAft>
-              <a:buNone/>
-            </a:pPr>
-            <a:r>
-              <a:t/>
-            </a:r>
-            <a:endParaRPr sz="1600">
-              <a:solidFill>
-                <a:schemeClr val="lt2"/>
-              </a:solidFill>
-            </a:endParaRPr>
-          </a:p>
-          <a:p>
-            <a:pPr indent="0" lvl="0" marL="0" rtl="0" algn="l">
-              <a:spcBef>
-                <a:spcPts val="0"/>
-              </a:spcBef>
-              <a:spcAft>
-                <a:spcPts val="0"/>
-              </a:spcAft>
-              <a:buNone/>
-            </a:pPr>
-            <a:r>
-              <a:rPr lang="en-GB" sz="1600">
-                <a:solidFill>
-                  <a:schemeClr val="lt2"/>
-                </a:solidFill>
-              </a:rPr>
-              <a:t>Functions:</a:t>
-            </a:r>
-            <a:endParaRPr sz="1600">
-              <a:solidFill>
-                <a:schemeClr val="lt2"/>
-              </a:solidFill>
-            </a:endParaRPr>
-          </a:p>
-          <a:p>
-            <a:pPr indent="-317500" lvl="0" marL="457200" rtl="0" algn="l">
-              <a:spcBef>
-                <a:spcPts val="0"/>
-              </a:spcBef>
-              <a:spcAft>
-                <a:spcPts val="0"/>
-              </a:spcAft>
-              <a:buClr>
-                <a:schemeClr val="dk1"/>
-              </a:buClr>
-              <a:buSzPts val="1400"/>
-              <a:buChar char="-"/>
-            </a:pPr>
-            <a:r>
-              <a:rPr lang="en-GB" sz="1600">
-                <a:solidFill>
-                  <a:schemeClr val="lt2"/>
-                </a:solidFill>
-              </a:rPr>
-              <a:t>Automated check if input follow format</a:t>
-            </a:r>
-            <a:endParaRPr sz="1600">
-              <a:solidFill>
-                <a:schemeClr val="lt2"/>
-              </a:solidFill>
-            </a:endParaRPr>
-          </a:p>
-          <a:p>
-            <a:pPr indent="-317500" lvl="0" marL="457200" rtl="0" algn="l">
-              <a:spcBef>
-                <a:spcPts val="0"/>
-              </a:spcBef>
-              <a:spcAft>
-                <a:spcPts val="0"/>
-              </a:spcAft>
-              <a:buClr>
-                <a:schemeClr val="dk1"/>
-              </a:buClr>
-              <a:buSzPts val="1400"/>
-              <a:buChar char="-"/>
-            </a:pPr>
-            <a:r>
-              <a:rPr lang="en-GB" sz="1600">
-                <a:solidFill>
-                  <a:schemeClr val="lt2"/>
-                </a:solidFill>
-              </a:rPr>
-              <a:t>Randomised capitalisation of word letters</a:t>
-            </a:r>
-            <a:endParaRPr sz="1600">
-              <a:solidFill>
-                <a:schemeClr val="lt2"/>
-              </a:solidFill>
-            </a:endParaRPr>
-          </a:p>
-          <a:p>
-            <a:pPr indent="-317500" lvl="0" marL="457200" rtl="0" algn="l">
-              <a:spcBef>
-                <a:spcPts val="0"/>
-              </a:spcBef>
-              <a:spcAft>
-                <a:spcPts val="0"/>
-              </a:spcAft>
-              <a:buClr>
-                <a:schemeClr val="dk1"/>
-              </a:buClr>
-              <a:buSzPts val="1400"/>
-              <a:buChar char="-"/>
-            </a:pPr>
-            <a:r>
-              <a:rPr lang="en-GB" sz="1600">
-                <a:solidFill>
-                  <a:schemeClr val="lt2"/>
-                </a:solidFill>
-              </a:rPr>
-              <a:t>Alternation of the string following </a:t>
-            </a:r>
-            <a:r>
-              <a:rPr lang="en-GB" sz="1600">
-                <a:solidFill>
-                  <a:schemeClr val="lt2"/>
-                </a:solidFill>
-              </a:rPr>
-              <a:t>format</a:t>
-            </a:r>
-            <a:r>
-              <a:rPr lang="en-GB" sz="1600">
-                <a:solidFill>
-                  <a:schemeClr val="lt2"/>
-                </a:solidFill>
-              </a:rPr>
-              <a:t>:</a:t>
-            </a:r>
-            <a:endParaRPr sz="1600">
-              <a:solidFill>
-                <a:schemeClr val="lt2"/>
-              </a:solidFill>
-            </a:endParaRPr>
-          </a:p>
-          <a:p>
-            <a:pPr indent="-317500" lvl="1" marL="914400" rtl="0" algn="l">
-              <a:spcBef>
-                <a:spcPts val="0"/>
-              </a:spcBef>
-              <a:spcAft>
-                <a:spcPts val="0"/>
-              </a:spcAft>
-              <a:buClr>
-                <a:schemeClr val="dk1"/>
-              </a:buClr>
-              <a:buSzPts val="1400"/>
-              <a:buChar char="-"/>
-            </a:pPr>
-            <a:r>
-              <a:rPr lang="en-GB" sz="1600">
-                <a:solidFill>
-                  <a:schemeClr val="lt2"/>
-                </a:solidFill>
-              </a:rPr>
-              <a:t>1 letter of word</a:t>
-            </a:r>
-            <a:endParaRPr sz="1600">
-              <a:solidFill>
-                <a:schemeClr val="lt2"/>
-              </a:solidFill>
-            </a:endParaRPr>
-          </a:p>
-          <a:p>
-            <a:pPr indent="-317500" lvl="1" marL="914400" rtl="0" algn="l">
-              <a:spcBef>
-                <a:spcPts val="0"/>
-              </a:spcBef>
-              <a:spcAft>
-                <a:spcPts val="0"/>
-              </a:spcAft>
-              <a:buClr>
-                <a:schemeClr val="dk1"/>
-              </a:buClr>
-              <a:buSzPts val="1400"/>
-              <a:buChar char="-"/>
-            </a:pPr>
-            <a:r>
-              <a:rPr lang="en-GB" sz="1600">
-                <a:solidFill>
-                  <a:schemeClr val="lt2"/>
-                </a:solidFill>
-              </a:rPr>
-              <a:t>1 digit of number</a:t>
-            </a:r>
-            <a:endParaRPr sz="1600">
-              <a:solidFill>
-                <a:schemeClr val="lt2"/>
-              </a:solidFill>
-            </a:endParaRPr>
-          </a:p>
-          <a:p>
-            <a:pPr indent="-317500" lvl="1" marL="914400" rtl="0" algn="l">
-              <a:spcBef>
-                <a:spcPts val="0"/>
-              </a:spcBef>
-              <a:spcAft>
-                <a:spcPts val="0"/>
-              </a:spcAft>
-              <a:buClr>
-                <a:schemeClr val="dk1"/>
-              </a:buClr>
-              <a:buSzPts val="1400"/>
-              <a:buChar char="-"/>
-            </a:pPr>
-            <a:r>
-              <a:rPr lang="en-GB" sz="1600">
-                <a:solidFill>
-                  <a:schemeClr val="lt2"/>
-                </a:solidFill>
-              </a:rPr>
-              <a:t>1 additional special character (depending on the </a:t>
-            </a:r>
-            <a:r>
-              <a:rPr lang="en-GB" sz="1600">
-                <a:solidFill>
-                  <a:schemeClr val="lt2"/>
-                </a:solidFill>
-              </a:rPr>
-              <a:t>lengths</a:t>
-            </a:r>
-            <a:r>
-              <a:rPr lang="en-GB" sz="1600">
-                <a:solidFill>
-                  <a:schemeClr val="lt2"/>
-                </a:solidFill>
-              </a:rPr>
-              <a:t> of the word might be more by the end)</a:t>
-            </a:r>
-            <a:endParaRPr sz="1600">
-              <a:solidFill>
-                <a:schemeClr val="lt2"/>
-              </a:solidFill>
-            </a:endParaRPr>
-          </a:p>
-          <a:p>
-            <a:pPr indent="0" lvl="0" marL="0" rtl="0" algn="l">
-              <a:spcBef>
-                <a:spcPts val="0"/>
-              </a:spcBef>
-              <a:spcAft>
-                <a:spcPts val="0"/>
-              </a:spcAft>
-              <a:buNone/>
-            </a:pPr>
-            <a:r>
               <a:t/>
             </a:r>
             <a:endParaRPr sz="1700">
@@ -6823,6 +7443,34 @@
           </a:p>
         </p:txBody>
       </p:sp>
+      <p:pic>
+        <p:nvPicPr>
+          <p:cNvPr id="83" name="Google Shape;83;p17"/>
+          <p:cNvPicPr preferRelativeResize="0"/>
+          <p:nvPr/>
+        </p:nvPicPr>
+        <p:blipFill>
+          <a:blip r:embed="rId3">
+            <a:alphaModFix/>
+          </a:blip>
+          <a:stretch>
+            <a:fillRect/>
+          </a:stretch>
+        </p:blipFill>
+        <p:spPr>
+          <a:xfrm>
+            <a:off x="4328575" y="845425"/>
+            <a:ext cx="4020001" cy="3784960"/>
+          </a:xfrm>
+          <a:prstGeom prst="rect">
+            <a:avLst/>
+          </a:prstGeom>
+          <a:noFill/>
+          <a:ln>
+            <a:noFill/>
+          </a:ln>
+        </p:spPr>
+      </p:pic>
     </p:spTree>
   </p:cSld>
   <p:clrMapOvr>
@@ -6831,12 +7479,72 @@
 </p:sld>
 </file>
 
-<file path=ppt/slides/slide4.xml><?xml version="1.0" encoding="utf-8"?>
+<file path=ppt/slides/slide6.xml><?xml version="1.0" encoding="utf-8"?>
+<p:sld xmlns:a="http://schemas.openxmlformats.org/drawingml/2006/main" xmlns:r="http://schemas.openxmlformats.org/officeDocument/2006/relationships" xmlns:mc="http://schemas.openxmlformats.org/markup-compatibility/2006" xmlns:mv="urn:schemas-microsoft-com:mac:vml" xmlns:p="http://schemas.openxmlformats.org/presentationml/2006/main" xmlns:c="http://schemas.openxmlformats.org/drawingml/2006/chart" xmlns:dgm="http://schemas.openxmlformats.org/drawingml/2006/diagram" xmlns:o="urn:schemas-microsoft-com:office:office" xmlns:v="urn:schemas-microsoft-com:vml" xmlns:pvml="urn:schemas-microsoft-com:office:powerpoint" xmlns:com="http://schemas.openxmlformats.org/drawingml/2006/compatibility" xmlns:p14="http://schemas.microsoft.com/office/powerpoint/2010/main" xmlns:p15="http://schemas.microsoft.com/office/powerpoint/2012/main" xmlns:ahyp="http://schemas.microsoft.com/office/drawing/2018/hyperlinkcolor">
+  <p:cSld>
+    <p:bg>
+      <p:bgPr>
+        <a:solidFill>
+          <a:schemeClr val="dk1"/>
+        </a:solidFill>
+      </p:bgPr>
+    </p:bg>
+    <p:spTree>
+      <p:nvGrpSpPr>
+        <p:cNvPr id="87" name="Shape 87"/>
+        <p:cNvGrpSpPr/>
+        <p:nvPr/>
+      </p:nvGrpSpPr>
+      <p:grpSpPr>
+        <a:xfrm>
+          <a:off x="0" y="0"/>
+          <a:ext cx="0" cy="0"/>
+          <a:chOff x="0" y="0"/>
+          <a:chExt cx="0" cy="0"/>
+        </a:xfrm>
+      </p:grpSpPr>
+      <p:pic>
+        <p:nvPicPr>
+          <p:cNvPr id="88" name="Google Shape;88;p18"/>
+          <p:cNvPicPr preferRelativeResize="0"/>
+          <p:nvPr/>
+        </p:nvPicPr>
+        <p:blipFill>
+          <a:blip r:embed="rId3">
+            <a:alphaModFix/>
+          </a:blip>
+          <a:stretch>
+            <a:fillRect/>
+          </a:stretch>
+        </p:blipFill>
+        <p:spPr>
+          <a:xfrm>
+            <a:off x="2114075" y="25888"/>
+            <a:ext cx="4046675" cy="5091724"/>
+          </a:xfrm>
+          <a:prstGeom prst="rect">
+            <a:avLst/>
+          </a:prstGeom>
+          <a:noFill/>
+          <a:ln>
+            <a:noFill/>
+          </a:ln>
+        </p:spPr>
+      </p:pic>
+    </p:spTree>
+  </p:cSld>
+  <p:clrMapOvr>
+    <a:masterClrMapping/>
+  </p:clrMapOvr>
+</p:sld>
+</file>
+
+<file path=ppt/slides/slide7.xml><?xml version="1.0" encoding="utf-8"?>
 <p:sld xmlns:a="http://schemas.openxmlformats.org/drawingml/2006/main" xmlns:r="http://schemas.openxmlformats.org/officeDocument/2006/relationships" xmlns:mc="http://schemas.openxmlformats.org/markup-compatibility/2006" xmlns:mv="urn:schemas-microsoft-com:mac:vml" xmlns:p="http://schemas.openxmlformats.org/presentationml/2006/main" xmlns:c="http://schemas.openxmlformats.org/drawingml/2006/chart" xmlns:dgm="http://schemas.openxmlformats.org/drawingml/2006/diagram" xmlns:o="urn:schemas-microsoft-com:office:office" xmlns:v="urn:schemas-microsoft-com:vml" xmlns:pvml="urn:schemas-microsoft-com:office:powerpoint" xmlns:com="http://schemas.openxmlformats.org/drawingml/2006/compatibility" xmlns:p14="http://schemas.microsoft.com/office/powerpoint/2010/main" xmlns:p15="http://schemas.microsoft.com/office/powerpoint/2012/main" xmlns:ahyp="http://schemas.microsoft.com/office/drawing/2018/hyperlinkcolor">
   <p:cSld>
     <p:spTree>
       <p:nvGrpSpPr>
-        <p:cNvPr id="74" name="Shape 74"/>
+        <p:cNvPr id="92" name="Shape 92"/>
         <p:cNvGrpSpPr/>
         <p:nvPr/>
       </p:nvGrpSpPr>
@@ -6850,7 +7558,7 @@
       </p:grpSpPr>
       <p:sp>
         <p:nvSpPr>
-          <p:cNvPr id="75" name="Google Shape;75;p16"/>
+          <p:cNvPr id="93" name="Google Shape;93;p19"/>
           <p:cNvSpPr txBox="1"/>
           <p:nvPr>
             <p:ph type="title"/>
@@ -6890,7 +7598,7 @@
       </p:sp>
       <p:sp>
         <p:nvSpPr>
-          <p:cNvPr id="76" name="Google Shape;76;p16"/>
+          <p:cNvPr id="94" name="Google Shape;94;p19"/>
           <p:cNvSpPr txBox="1"/>
           <p:nvPr>
             <p:ph idx="1" type="body"/>
@@ -6907,7 +7615,7 @@
         </p:spPr>
         <p:txBody>
           <a:bodyPr anchorCtr="0" anchor="t" bIns="91425" lIns="91425" spcFirstLastPara="1" rIns="91425" wrap="square" tIns="91425">
-            <a:normAutofit/>
+            <a:normAutofit lnSpcReduction="20000"/>
           </a:bodyPr>
           <a:lstStyle/>
           <a:p>
@@ -6932,13 +7640,117 @@
                 <a:spcPts val="1200"/>
               </a:spcBef>
               <a:spcAft>
-                <a:spcPts val="1200"/>
+                <a:spcPts val="0"/>
               </a:spcAft>
               <a:buNone/>
             </a:pPr>
             <a:r>
               <a:rPr lang="en-GB"/>
-              <a:t>Our code capitalise </a:t>
+              <a:t>At the </a:t>
+            </a:r>
+            <a:r>
+              <a:rPr lang="en-GB"/>
+              <a:t>point</a:t>
+            </a:r>
+            <a:r>
+              <a:rPr lang="en-GB"/>
+              <a:t> of input, is.alpha and is.digit check if input is correct</a:t>
+            </a:r>
+            <a:endParaRPr/>
+          </a:p>
+          <a:p>
+            <a:pPr indent="0" lvl="0" marL="0" rtl="0" algn="l">
+              <a:spcBef>
+                <a:spcPts val="1200"/>
+              </a:spcBef>
+              <a:spcAft>
+                <a:spcPts val="0"/>
+              </a:spcAft>
+              <a:buNone/>
+            </a:pPr>
+            <a:r>
+              <a:rPr lang="en-GB"/>
+              <a:t>If not correct, message asking to put correct data</a:t>
+            </a:r>
+            <a:endParaRPr/>
+          </a:p>
+          <a:p>
+            <a:pPr indent="0" lvl="0" marL="0" rtl="0" algn="l">
+              <a:spcBef>
+                <a:spcPts val="1200"/>
+              </a:spcBef>
+              <a:spcAft>
+                <a:spcPts val="0"/>
+              </a:spcAft>
+              <a:buNone/>
+            </a:pPr>
+            <a:r>
+              <a:rPr lang="en-GB"/>
+              <a:t>After input is confirmed as correct</a:t>
+            </a:r>
+            <a:endParaRPr/>
+          </a:p>
+          <a:p>
+            <a:pPr indent="0" lvl="0" marL="0" rtl="0" algn="l">
+              <a:spcBef>
+                <a:spcPts val="1200"/>
+              </a:spcBef>
+              <a:spcAft>
+                <a:spcPts val="0"/>
+              </a:spcAft>
+              <a:buNone/>
+            </a:pPr>
+            <a:r>
+              <a:rPr lang="en-GB"/>
+              <a:t>Our code capitalise random letters in the Word</a:t>
+            </a:r>
+            <a:endParaRPr/>
+          </a:p>
+          <a:p>
+            <a:pPr indent="0" lvl="0" marL="0" rtl="0" algn="l">
+              <a:spcBef>
+                <a:spcPts val="1200"/>
+              </a:spcBef>
+              <a:spcAft>
+                <a:spcPts val="0"/>
+              </a:spcAft>
+              <a:buNone/>
+            </a:pPr>
+            <a:r>
+              <a:rPr lang="en-GB"/>
+              <a:t>We are adding new variable with special characters</a:t>
+            </a:r>
+            <a:endParaRPr/>
+          </a:p>
+          <a:p>
+            <a:pPr indent="0" lvl="0" marL="0" rtl="0" algn="l">
+              <a:spcBef>
+                <a:spcPts val="1200"/>
+              </a:spcBef>
+              <a:spcAft>
+                <a:spcPts val="0"/>
+              </a:spcAft>
+              <a:buNone/>
+            </a:pPr>
+            <a:r>
+              <a:rPr lang="en-GB"/>
+              <a:t>Creation of 1 alternating string made up of Word+Year+special characters</a:t>
+            </a:r>
+            <a:endParaRPr/>
+          </a:p>
+          <a:p>
+            <a:pPr indent="0" lvl="0" marL="0" rtl="0" algn="l">
+              <a:spcBef>
+                <a:spcPts val="1200"/>
+              </a:spcBef>
+              <a:spcAft>
+                <a:spcPts val="1200"/>
+              </a:spcAft>
+              <a:buNone/>
+            </a:pPr>
+            <a:r>
+              <a:rPr lang="en-GB"/>
+              <a:t>Output: After Password is generate, 3 options for user to decide -&gt; Yes, No, Exit</a:t>
             </a:r>
             <a:endParaRPr/>
           </a:p>
@@ -6953,6 +7765,285 @@
 </file>
 
 <file path=ppt/theme/theme1.xml><?xml version="1.0" encoding="utf-8"?>
+<a:theme xmlns:a="http://schemas.openxmlformats.org/drawingml/2006/main" xmlns:r="http://schemas.openxmlformats.org/officeDocument/2006/relationships">
+  <a:themeElements>
+    <a:clrScheme name="Default">
+      <a:dk1>
+        <a:srgbClr val="000000"/>
+      </a:dk1>
+      <a:lt1>
+        <a:srgbClr val="FFFFFF"/>
+      </a:lt1>
+      <a:dk2>
+        <a:srgbClr val="158158"/>
+      </a:dk2>
+      <a:lt2>
+        <a:srgbClr val="F3F3F3"/>
+      </a:lt2>
+      <a:accent1>
+        <a:srgbClr val="058DC7"/>
+      </a:accent1>
+      <a:accent2>
+        <a:srgbClr val="50B432"/>
+      </a:accent2>
+      <a:accent3>
+        <a:srgbClr val="ED561B"/>
+      </a:accent3>
+      <a:accent4>
+        <a:srgbClr val="EDEF00"/>
+      </a:accent4>
+      <a:accent5>
+        <a:srgbClr val="24CBE5"/>
+      </a:accent5>
+      <a:accent6>
+        <a:srgbClr val="64E572"/>
+      </a:accent6>
+      <a:hlink>
+        <a:srgbClr val="2200CC"/>
+      </a:hlink>
+      <a:folHlink>
+        <a:srgbClr val="551A8B"/>
+      </a:folHlink>
+    </a:clrScheme>
+    <a:fontScheme name="Office">
+      <a:majorFont>
+        <a:latin typeface="Arial"/>
+        <a:ea typeface=""/>
+        <a:cs typeface=""/>
+        <a:font script="Jpan" typeface="ＭＳ Ｐゴシック"/>
+        <a:font script="Hang" typeface="맑은 고딕"/>
+        <a:font script="Hans" typeface="宋体"/>
+        <a:font script="Hant" typeface="新細明體"/>
+        <a:font script="Arab" typeface="Times New Roman"/>
+        <a:font script="Hebr" typeface="Times New Roman"/>
+        <a:font script="Thai" typeface="Angsana New"/>
+        <a:font script="Ethi" typeface="Nyala"/>
+        <a:font script="Beng" typeface="Vrinda"/>
+        <a:font script="Gujr" typeface="Shruti"/>
+        <a:font script="Khmr" typeface="MoolBoran"/>
+        <a:font script="Knda" typeface="Tunga"/>
+        <a:font script="Guru" typeface="Raavi"/>
+        <a:font script="Cans" typeface="Euphemia"/>
+        <a:font script="Cher" typeface="Plantagenet Cherokee"/>
+        <a:font script="Yiii" typeface="Microsoft Yi Baiti"/>
+        <a:font script="Tibt" typeface="Microsoft Himalaya"/>
+        <a:font script="Thaa" typeface="MV Boli"/>
+        <a:font script="Deva" typeface="Mangal"/>
+        <a:font script="Telu" typeface="Gautami"/>
+        <a:font script="Taml" typeface="Latha"/>
+        <a:font script="Syrc" typeface="Estrangelo Edessa"/>
+        <a:font script="Orya" typeface="Kalinga"/>
+        <a:font script="Mlym" typeface="Kartika"/>
+        <a:font script="Laoo" typeface="DokChampa"/>
+        <a:font script="Sinh" typeface="Iskoola Pota"/>
+        <a:font script="Mong" typeface="Mongolian Baiti"/>
+        <a:font script="Viet" typeface="Times New Roman"/>
+        <a:font script="Uigh" typeface="Microsoft Uighur"/>
+        <a:font script="Geor" typeface="Sylfaen"/>
+      </a:majorFont>
+      <a:minorFont>
+        <a:latin typeface="Arial"/>
+        <a:ea typeface=""/>
+        <a:cs typeface=""/>
+        <a:font script="Jpan" typeface="ＭＳ Ｐゴシック"/>
+        <a:font script="Hang" typeface="맑은 고딕"/>
+        <a:font script="Hans" typeface="宋体"/>
+        <a:font script="Hant" typeface="新細明體"/>
+        <a:font script="Arab" typeface="Arial"/>
+        <a:font script="Hebr" typeface="Arial"/>
+        <a:font script="Thai" typeface="Cordia New"/>
+        <a:font script="Ethi" typeface="Nyala"/>
+        <a:font script="Beng" typeface="Vrinda"/>
+        <a:font script="Gujr" typeface="Shruti"/>
+        <a:font script="Khmr" typeface="DaunPenh"/>
+        <a:font script="Knda" typeface="Tunga"/>
+        <a:font script="Guru" typeface="Raavi"/>
+        <a:font script="Cans" typeface="Euphemia"/>
+        <a:font script="Cher" typeface="Plantagenet Cherokee"/>
+        <a:font script="Yiii" typeface="Microsoft Yi Baiti"/>
+        <a:font script="Tibt" typeface="Microsoft Himalaya"/>
+        <a:font script="Thaa" typeface="MV Boli"/>
+        <a:font script="Deva" typeface="Mangal"/>
+        <a:font script="Telu" typeface="Gautami"/>
+        <a:font script="Taml" typeface="Latha"/>
+        <a:font script="Syrc" typeface="Estrangelo Edessa"/>
+        <a:font script="Orya" typeface="Kalinga"/>
+        <a:font script="Mlym" typeface="Kartika"/>
+        <a:font script="Laoo" typeface="DokChampa"/>
+        <a:font script="Sinh" typeface="Iskoola Pota"/>
+        <a:font script="Mong" typeface="Mongolian Baiti"/>
+        <a:font script="Viet" typeface="Arial"/>
+        <a:font script="Uigh" typeface="Microsoft Uighur"/>
+        <a:font script="Geor" typeface="Sylfaen"/>
+      </a:minorFont>
+    </a:fontScheme>
+    <a:fmtScheme name="Office">
+      <a:fillStyleLst>
+        <a:solidFill>
+          <a:schemeClr val="phClr"/>
+        </a:solidFill>
+        <a:gradFill rotWithShape="1">
+          <a:gsLst>
+            <a:gs pos="0">
+              <a:schemeClr val="phClr">
+                <a:tint val="50000"/>
+                <a:satMod val="300000"/>
+              </a:schemeClr>
+            </a:gs>
+            <a:gs pos="35000">
+              <a:schemeClr val="phClr">
+                <a:tint val="37000"/>
+                <a:satMod val="300000"/>
+              </a:schemeClr>
+            </a:gs>
+            <a:gs pos="100000">
+              <a:schemeClr val="phClr">
+                <a:tint val="15000"/>
+                <a:satMod val="350000"/>
+              </a:schemeClr>
+            </a:gs>
+          </a:gsLst>
+          <a:lin ang="16200000" scaled="1"/>
+        </a:gradFill>
+        <a:gradFill rotWithShape="1">
+          <a:gsLst>
+            <a:gs pos="0">
+              <a:schemeClr val="phClr">
+                <a:tint val="100000"/>
+                <a:shade val="100000"/>
+                <a:satMod val="130000"/>
+              </a:schemeClr>
+            </a:gs>
+            <a:gs pos="100000">
+              <a:schemeClr val="phClr">
+                <a:tint val="50000"/>
+                <a:shade val="100000"/>
+                <a:satMod val="350000"/>
+              </a:schemeClr>
+            </a:gs>
+          </a:gsLst>
+          <a:lin ang="16200000" scaled="0"/>
+        </a:gradFill>
+      </a:fillStyleLst>
+      <a:lnStyleLst>
+        <a:ln w="9525" cap="flat" cmpd="sng" algn="ctr">
+          <a:solidFill>
+            <a:schemeClr val="phClr">
+              <a:shade val="95000"/>
+              <a:satMod val="105000"/>
+            </a:schemeClr>
+          </a:solidFill>
+          <a:prstDash val="solid"/>
+        </a:ln>
+        <a:ln w="25400" cap="flat" cmpd="sng" algn="ctr">
+          <a:solidFill>
+            <a:schemeClr val="phClr"/>
+          </a:solidFill>
+          <a:prstDash val="solid"/>
+        </a:ln>
+        <a:ln w="38100" cap="flat" cmpd="sng" algn="ctr">
+          <a:solidFill>
+            <a:schemeClr val="phClr"/>
+          </a:solidFill>
+          <a:prstDash val="solid"/>
+        </a:ln>
+      </a:lnStyleLst>
+      <a:effectStyleLst>
+        <a:effectStyle>
+          <a:effectLst>
+            <a:outerShdw blurRad="40000" dist="20000" dir="5400000" rotWithShape="0">
+              <a:srgbClr val="000000">
+                <a:alpha val="38000"/>
+              </a:srgbClr>
+            </a:outerShdw>
+          </a:effectLst>
+        </a:effectStyle>
+        <a:effectStyle>
+          <a:effectLst>
+            <a:outerShdw blurRad="40000" dist="23000" dir="5400000" rotWithShape="0">
+              <a:srgbClr val="000000">
+                <a:alpha val="35000"/>
+              </a:srgbClr>
+            </a:outerShdw>
+          </a:effectLst>
+        </a:effectStyle>
+        <a:effectStyle>
+          <a:effectLst>
+            <a:outerShdw blurRad="40000" dist="23000" dir="5400000" rotWithShape="0">
+              <a:srgbClr val="000000">
+                <a:alpha val="35000"/>
+              </a:srgbClr>
+            </a:outerShdw>
+          </a:effectLst>
+          <a:scene3d>
+            <a:camera prst="orthographicFront">
+              <a:rot lat="0" lon="0" rev="0"/>
+            </a:camera>
+            <a:lightRig rig="threePt" dir="t">
+              <a:rot lat="0" lon="0" rev="1200000"/>
+            </a:lightRig>
+          </a:scene3d>
+          <a:sp3d>
+            <a:bevelT w="63500" h="25400"/>
+          </a:sp3d>
+        </a:effectStyle>
+      </a:effectStyleLst>
+      <a:bgFillStyleLst>
+        <a:solidFill>
+          <a:schemeClr val="phClr"/>
+        </a:solidFill>
+        <a:gradFill rotWithShape="1">
+          <a:gsLst>
+            <a:gs pos="0">
+              <a:schemeClr val="phClr">
+                <a:tint val="40000"/>
+                <a:satMod val="350000"/>
+              </a:schemeClr>
+            </a:gs>
+            <a:gs pos="40000">
+              <a:schemeClr val="phClr">
+                <a:tint val="45000"/>
+                <a:shade val="99000"/>
+                <a:satMod val="350000"/>
+              </a:schemeClr>
+            </a:gs>
+            <a:gs pos="100000">
+              <a:schemeClr val="phClr">
+                <a:shade val="20000"/>
+                <a:satMod val="255000"/>
+              </a:schemeClr>
+            </a:gs>
+          </a:gsLst>
+          <a:path path="circle">
+            <a:fillToRect l="50000" t="-80000" r="50000" b="180000"/>
+          </a:path>
+        </a:gradFill>
+        <a:gradFill rotWithShape="1">
+          <a:gsLst>
+            <a:gs pos="0">
+              <a:schemeClr val="phClr">
+                <a:tint val="80000"/>
+                <a:satMod val="300000"/>
+              </a:schemeClr>
+            </a:gs>
+            <a:gs pos="100000">
+              <a:schemeClr val="phClr">
+                <a:shade val="30000"/>
+                <a:satMod val="200000"/>
+              </a:schemeClr>
+            </a:gs>
+          </a:gsLst>
+          <a:path path="circle">
+            <a:fillToRect l="50000" t="50000" r="50000" b="50000"/>
+          </a:path>
+        </a:gradFill>
+      </a:bgFillStyleLst>
+    </a:fmtScheme>
+  </a:themeElements>
+</a:theme>
+</file>
+
+<file path=ppt/theme/theme2.xml><?xml version="1.0" encoding="utf-8"?>
 <a:theme xmlns:a="http://schemas.openxmlformats.org/drawingml/2006/main" xmlns:r="http://schemas.openxmlformats.org/officeDocument/2006/relationships" name="Simple Dark">
   <a:themeElements>
     <a:clrScheme name="Simple Dark">
@@ -7229,283 +8320,4 @@
     </a:fmtScheme>
   </a:themeElements>
 </a:theme>
-</file>
-
-<file path=ppt/theme/theme2.xml><?xml version="1.0" encoding="utf-8"?>
-<a:theme xmlns:a="http://schemas.openxmlformats.org/drawingml/2006/main" xmlns:r="http://schemas.openxmlformats.org/officeDocument/2006/relationships">
-  <a:themeElements>
-    <a:clrScheme name="Default">
-      <a:dk1>
-        <a:srgbClr val="000000"/>
-      </a:dk1>
-      <a:lt1>
-        <a:srgbClr val="FFFFFF"/>
-      </a:lt1>
-      <a:dk2>
-        <a:srgbClr val="158158"/>
-      </a:dk2>
-      <a:lt2>
-        <a:srgbClr val="F3F3F3"/>
-      </a:lt2>
-      <a:accent1>
-        <a:srgbClr val="058DC7"/>
-      </a:accent1>
-      <a:accent2>
-        <a:srgbClr val="50B432"/>
-      </a:accent2>
-      <a:accent3>
-        <a:srgbClr val="ED561B"/>
-      </a:accent3>
-      <a:accent4>
-        <a:srgbClr val="EDEF00"/>
-      </a:accent4>
-      <a:accent5>
-        <a:srgbClr val="24CBE5"/>
-      </a:accent5>
-      <a:accent6>
-        <a:srgbClr val="64E572"/>
-      </a:accent6>
-      <a:hlink>
-        <a:srgbClr val="2200CC"/>
-      </a:hlink>
-      <a:folHlink>
-        <a:srgbClr val="551A8B"/>
-      </a:folHlink>
-    </a:clrScheme>
-    <a:fontScheme name="Office">
-      <a:majorFont>
-        <a:latin typeface="Arial"/>
-        <a:ea typeface=""/>
-        <a:cs typeface=""/>
-        <a:font script="Jpan" typeface="ＭＳ Ｐゴシック"/>
-        <a:font script="Hang" typeface="맑은 고딕"/>
-        <a:font script="Hans" typeface="宋体"/>
-        <a:font script="Hant" typeface="新細明體"/>
-        <a:font script="Arab" typeface="Times New Roman"/>
-        <a:font script="Hebr" typeface="Times New Roman"/>
-        <a:font script="Thai" typeface="Angsana New"/>
-        <a:font script="Ethi" typeface="Nyala"/>
-        <a:font script="Beng" typeface="Vrinda"/>
-        <a:font script="Gujr" typeface="Shruti"/>
-        <a:font script="Khmr" typeface="MoolBoran"/>
-        <a:font script="Knda" typeface="Tunga"/>
-        <a:font script="Guru" typeface="Raavi"/>
-        <a:font script="Cans" typeface="Euphemia"/>
-        <a:font script="Cher" typeface="Plantagenet Cherokee"/>
-        <a:font script="Yiii" typeface="Microsoft Yi Baiti"/>
-        <a:font script="Tibt" typeface="Microsoft Himalaya"/>
-        <a:font script="Thaa" typeface="MV Boli"/>
-        <a:font script="Deva" typeface="Mangal"/>
-        <a:font script="Telu" typeface="Gautami"/>
-        <a:font script="Taml" typeface="Latha"/>
-        <a:font script="Syrc" typeface="Estrangelo Edessa"/>
-        <a:font script="Orya" typeface="Kalinga"/>
-        <a:font script="Mlym" typeface="Kartika"/>
-        <a:font script="Laoo" typeface="DokChampa"/>
-        <a:font script="Sinh" typeface="Iskoola Pota"/>
-        <a:font script="Mong" typeface="Mongolian Baiti"/>
-        <a:font script="Viet" typeface="Times New Roman"/>
-        <a:font script="Uigh" typeface="Microsoft Uighur"/>
-        <a:font script="Geor" typeface="Sylfaen"/>
-      </a:majorFont>
-      <a:minorFont>
-        <a:latin typeface="Arial"/>
-        <a:ea typeface=""/>
-        <a:cs typeface=""/>
-        <a:font script="Jpan" typeface="ＭＳ Ｐゴシック"/>
-        <a:font script="Hang" typeface="맑은 고딕"/>
-        <a:font script="Hans" typeface="宋体"/>
-        <a:font script="Hant" typeface="新細明體"/>
-        <a:font script="Arab" typeface="Arial"/>
-        <a:font script="Hebr" typeface="Arial"/>
-        <a:font script="Thai" typeface="Cordia New"/>
-        <a:font script="Ethi" typeface="Nyala"/>
-        <a:font script="Beng" typeface="Vrinda"/>
-        <a:font script="Gujr" typeface="Shruti"/>
-        <a:font script="Khmr" typeface="DaunPenh"/>
-        <a:font script="Knda" typeface="Tunga"/>
-        <a:font script="Guru" typeface="Raavi"/>
-        <a:font script="Cans" typeface="Euphemia"/>
-        <a:font script="Cher" typeface="Plantagenet Cherokee"/>
-        <a:font script="Yiii" typeface="Microsoft Yi Baiti"/>
-        <a:font script="Tibt" typeface="Microsoft Himalaya"/>
-        <a:font script="Thaa" typeface="MV Boli"/>
-        <a:font script="Deva" typeface="Mangal"/>
-        <a:font script="Telu" typeface="Gautami"/>
-        <a:font script="Taml" typeface="Latha"/>
-        <a:font script="Syrc" typeface="Estrangelo Edessa"/>
-        <a:font script="Orya" typeface="Kalinga"/>
-        <a:font script="Mlym" typeface="Kartika"/>
-        <a:font script="Laoo" typeface="DokChampa"/>
-        <a:font script="Sinh" typeface="Iskoola Pota"/>
-        <a:font script="Mong" typeface="Mongolian Baiti"/>
-        <a:font script="Viet" typeface="Arial"/>
-        <a:font script="Uigh" typeface="Microsoft Uighur"/>
-        <a:font script="Geor" typeface="Sylfaen"/>
-      </a:minorFont>
-    </a:fontScheme>
-    <a:fmtScheme name="Office">
-      <a:fillStyleLst>
-        <a:solidFill>
-          <a:schemeClr val="phClr"/>
-        </a:solidFill>
-        <a:gradFill rotWithShape="1">
-          <a:gsLst>
-            <a:gs pos="0">
-              <a:schemeClr val="phClr">
-                <a:tint val="50000"/>
-                <a:satMod val="300000"/>
-              </a:schemeClr>
-            </a:gs>
-            <a:gs pos="35000">
-              <a:schemeClr val="phClr">
-                <a:tint val="37000"/>
-                <a:satMod val="300000"/>
-              </a:schemeClr>
-            </a:gs>
-            <a:gs pos="100000">
-              <a:schemeClr val="phClr">
-                <a:tint val="15000"/>
-                <a:satMod val="350000"/>
-              </a:schemeClr>
-            </a:gs>
-          </a:gsLst>
-          <a:lin ang="16200000" scaled="1"/>
-        </a:gradFill>
-        <a:gradFill rotWithShape="1">
-          <a:gsLst>
-            <a:gs pos="0">
-              <a:schemeClr val="phClr">
-                <a:tint val="100000"/>
-                <a:shade val="100000"/>
-                <a:satMod val="130000"/>
-              </a:schemeClr>
-            </a:gs>
-            <a:gs pos="100000">
-              <a:schemeClr val="phClr">
-                <a:tint val="50000"/>
-                <a:shade val="100000"/>
-                <a:satMod val="350000"/>
-              </a:schemeClr>
-            </a:gs>
-          </a:gsLst>
-          <a:lin ang="16200000" scaled="0"/>
-        </a:gradFill>
-      </a:fillStyleLst>
-      <a:lnStyleLst>
-        <a:ln w="9525" cap="flat" cmpd="sng" algn="ctr">
-          <a:solidFill>
-            <a:schemeClr val="phClr">
-              <a:shade val="95000"/>
-              <a:satMod val="105000"/>
-            </a:schemeClr>
-          </a:solidFill>
-          <a:prstDash val="solid"/>
-        </a:ln>
-        <a:ln w="25400" cap="flat" cmpd="sng" algn="ctr">
-          <a:solidFill>
-            <a:schemeClr val="phClr"/>
-          </a:solidFill>
-          <a:prstDash val="solid"/>
-        </a:ln>
-        <a:ln w="38100" cap="flat" cmpd="sng" algn="ctr">
-          <a:solidFill>
-            <a:schemeClr val="phClr"/>
-          </a:solidFill>
-          <a:prstDash val="solid"/>
-        </a:ln>
-      </a:lnStyleLst>
-      <a:effectStyleLst>
-        <a:effectStyle>
-          <a:effectLst>
-            <a:outerShdw blurRad="40000" dist="20000" dir="5400000" rotWithShape="0">
-              <a:srgbClr val="000000">
-                <a:alpha val="38000"/>
-              </a:srgbClr>
-            </a:outerShdw>
-          </a:effectLst>
-        </a:effectStyle>
-        <a:effectStyle>
-          <a:effectLst>
-            <a:outerShdw blurRad="40000" dist="23000" dir="5400000" rotWithShape="0">
-              <a:srgbClr val="000000">
-                <a:alpha val="35000"/>
-              </a:srgbClr>
-            </a:outerShdw>
-          </a:effectLst>
-        </a:effectStyle>
-        <a:effectStyle>
-          <a:effectLst>
-            <a:outerShdw blurRad="40000" dist="23000" dir="5400000" rotWithShape="0">
-              <a:srgbClr val="000000">
-                <a:alpha val="35000"/>
-              </a:srgbClr>
-            </a:outerShdw>
-          </a:effectLst>
-          <a:scene3d>
-            <a:camera prst="orthographicFront">
-              <a:rot lat="0" lon="0" rev="0"/>
-            </a:camera>
-            <a:lightRig rig="threePt" dir="t">
-              <a:rot lat="0" lon="0" rev="1200000"/>
-            </a:lightRig>
-          </a:scene3d>
-          <a:sp3d>
-            <a:bevelT w="63500" h="25400"/>
-          </a:sp3d>
-        </a:effectStyle>
-      </a:effectStyleLst>
-      <a:bgFillStyleLst>
-        <a:solidFill>
-          <a:schemeClr val="phClr"/>
-        </a:solidFill>
-        <a:gradFill rotWithShape="1">
-          <a:gsLst>
-            <a:gs pos="0">
-              <a:schemeClr val="phClr">
-                <a:tint val="40000"/>
-                <a:satMod val="350000"/>
-              </a:schemeClr>
-            </a:gs>
-            <a:gs pos="40000">
-              <a:schemeClr val="phClr">
-                <a:tint val="45000"/>
-                <a:shade val="99000"/>
-                <a:satMod val="350000"/>
-              </a:schemeClr>
-            </a:gs>
-            <a:gs pos="100000">
-              <a:schemeClr val="phClr">
-                <a:shade val="20000"/>
-                <a:satMod val="255000"/>
-              </a:schemeClr>
-            </a:gs>
-          </a:gsLst>
-          <a:path path="circle">
-            <a:fillToRect l="50000" t="-80000" r="50000" b="180000"/>
-          </a:path>
-        </a:gradFill>
-        <a:gradFill rotWithShape="1">
-          <a:gsLst>
-            <a:gs pos="0">
-              <a:schemeClr val="phClr">
-                <a:tint val="80000"/>
-                <a:satMod val="300000"/>
-              </a:schemeClr>
-            </a:gs>
-            <a:gs pos="100000">
-              <a:schemeClr val="phClr">
-                <a:shade val="30000"/>
-                <a:satMod val="200000"/>
-              </a:schemeClr>
-            </a:gs>
-          </a:gsLst>
-          <a:path path="circle">
-            <a:fillToRect l="50000" t="50000" r="50000" b="50000"/>
-          </a:path>
-        </a:gradFill>
-      </a:bgFillStyleLst>
-    </a:fmtScheme>
-  </a:themeElements>
-</a:theme>
 </file>
</xml_diff>